<commit_message>
Update Presentation ASPNET MVC Core - Part I.pptx
</commit_message>
<xml_diff>
--- a/Presentation ASPNET MVC Core - Part I.pptx
+++ b/Presentation ASPNET MVC Core - Part I.pptx
@@ -381,7 +381,7 @@
           <a:p>
             <a:fld id="{CD54E0B9-A397-428E-BA01-CD7A34B572EB}" type="datetimeFigureOut">
               <a:rPr lang="en-US" smtClean="0"/>
-              <a:t>5/16/2019</a:t>
+              <a:t>5/17/2020</a:t>
             </a:fld>
             <a:endParaRPr lang="en-US"/>
           </a:p>
@@ -546,7 +546,7 @@
           <a:p>
             <a:fld id="{AA161301-18C9-4CA0-A0BF-791B6E0DDD4D}" type="datetimeFigureOut">
               <a:rPr lang="en-GB" smtClean="0"/>
-              <a:t>16/05/2019</a:t>
+              <a:t>17/05/2020</a:t>
             </a:fld>
             <a:endParaRPr lang="en-GB"/>
           </a:p>
@@ -14041,7 +14041,7 @@
           <a:p>
             <a:r>
               <a:rPr lang="en-US" dirty="0"/>
-              <a:t>HelloWorld (ASP .NET Core 2)</a:t>
+              <a:t>HelloWorld (ASP .NET Core 3)</a:t>
             </a:r>
           </a:p>
         </p:txBody>
@@ -14158,14 +14158,6 @@
             <a:r>
               <a:rPr lang="en-US" b="1" dirty="0"/>
               <a:t>2019</a:t>
-            </a:r>
-            <a:r>
-              <a:rPr lang="en-US" dirty="0"/>
-              <a:t> / </a:t>
-            </a:r>
-            <a:r>
-              <a:rPr lang="en-US" b="1" dirty="0"/>
-              <a:t>2017</a:t>
             </a:r>
             <a:r>
               <a:rPr lang="en-US" dirty="0"/>
@@ -15819,11 +15811,7 @@
             </a:pPr>
             <a:r>
               <a:rPr lang="en-US" b="1" dirty="0"/>
-              <a:t>view models </a:t>
-            </a:r>
-            <a:r>
-              <a:rPr lang="en-US" b="1"/>
-              <a:t>(presentation models) </a:t>
+              <a:t>view models (presentation models) </a:t>
             </a:r>
             <a:r>
               <a:rPr lang="en-US" dirty="0"/>
@@ -18700,7 +18688,7 @@
             </a:r>
             <a:r>
               <a:rPr lang="en-US" b="1" dirty="0"/>
-              <a:t>await</a:t>
+              <a:t>async/await</a:t>
             </a:r>
             <a:r>
               <a:rPr lang="en-US" dirty="0"/>
@@ -19914,7 +19902,7 @@
           <p:nvPr>
             <p:extLst>
               <p:ext uri="{D42A27DB-BD31-4B8C-83A1-F6EECF244321}">
-                <p14:modId xmlns:p14="http://schemas.microsoft.com/office/powerpoint/2010/main" val="2997397013"/>
+                <p14:modId xmlns:p14="http://schemas.microsoft.com/office/powerpoint/2010/main" val="477031977"/>
               </p:ext>
             </p:extLst>
           </p:nvPr>
@@ -20204,19 +20192,7 @@
                         <a:rPr lang="en-US" sz="2400" dirty="0">
                           <a:effectLst/>
                         </a:rPr>
-                        <a:t>This is where view component classes, which are used to display </a:t>
-                      </a:r>
-                      <a:r>
-                        <a:rPr lang="en-US" sz="2400" dirty="0" err="1">
-                          <a:effectLst/>
-                        </a:rPr>
-                        <a:t>selfcontained</a:t>
-                      </a:r>
-                      <a:r>
-                        <a:rPr lang="en-US" sz="2400" dirty="0">
-                          <a:effectLst/>
-                        </a:rPr>
-                        <a:t> features such as shopping carts, are defined.</a:t>
+                        <a:t>This is where view component classes, which are used to display self contained features such as shopping carts, are defined.</a:t>
                       </a:r>
                       <a:endParaRPr lang="ro-RO" sz="2400" dirty="0">
                         <a:effectLst/>
@@ -20376,14 +20352,14 @@
           <p:nvPr>
             <p:extLst>
               <p:ext uri="{D42A27DB-BD31-4B8C-83A1-F6EECF244321}">
-                <p14:modId xmlns:p14="http://schemas.microsoft.com/office/powerpoint/2010/main" val="921413878"/>
+                <p14:modId xmlns:p14="http://schemas.microsoft.com/office/powerpoint/2010/main" val="44083046"/>
               </p:ext>
             </p:extLst>
           </p:nvPr>
         </p:nvGraphicFramePr>
         <p:xfrm>
-          <a:off x="551384" y="1804865"/>
-          <a:ext cx="11161240" cy="3926296"/>
+          <a:off x="551384" y="2011560"/>
+          <a:ext cx="11161240" cy="3505672"/>
         </p:xfrm>
         <a:graphic>
           <a:graphicData uri="http://schemas.openxmlformats.org/drawingml/2006/table">
@@ -20589,23 +20565,7 @@
                         <a:rPr lang="en-US" sz="2400" dirty="0">
                           <a:effectLst/>
                         </a:rPr>
-                        <a:t>This is where details of database schemas are stored so that deployment</a:t>
-                      </a:r>
-                    </a:p>
-                    <a:p>
-                      <a:pPr>
-                        <a:lnSpc>
-                          <a:spcPct val="115000"/>
-                        </a:lnSpc>
-                        <a:spcAft>
-                          <a:spcPts val="0"/>
-                        </a:spcAft>
-                      </a:pPr>
-                      <a:r>
-                        <a:rPr lang="en-US" sz="2400" dirty="0">
-                          <a:effectLst/>
-                        </a:rPr>
-                        <a:t>databases can be updated.</a:t>
+                        <a:t>This is where details of database schemas are stored so that deployment databases can be updated.</a:t>
                       </a:r>
                       <a:endParaRPr lang="ro-RO" sz="2400" dirty="0">
                         <a:effectLst/>
@@ -21146,14 +21106,14 @@
           <p:nvPr>
             <p:extLst>
               <p:ext uri="{D42A27DB-BD31-4B8C-83A1-F6EECF244321}">
-                <p14:modId xmlns:p14="http://schemas.microsoft.com/office/powerpoint/2010/main" val="1422501522"/>
+                <p14:modId xmlns:p14="http://schemas.microsoft.com/office/powerpoint/2010/main" val="3663380446"/>
               </p:ext>
             </p:extLst>
           </p:nvPr>
         </p:nvGraphicFramePr>
         <p:xfrm>
           <a:off x="551384" y="1804865"/>
-          <a:ext cx="11161240" cy="4718142"/>
+          <a:ext cx="11161240" cy="3085048"/>
         </p:xfrm>
         <a:graphic>
           <a:graphicData uri="http://schemas.openxmlformats.org/drawingml/2006/table">
@@ -21500,166 +21460,6 @@
                           <a:ea typeface="Calibri"/>
                           <a:cs typeface="Times New Roman"/>
                         </a:rPr>
-                        <a:t>bower.json</a:t>
-                      </a:r>
-                      <a:endParaRPr lang="ro-RO" sz="2400" dirty="0">
-                        <a:effectLst/>
-                        <a:latin typeface="Calibri"/>
-                        <a:ea typeface="Calibri"/>
-                        <a:cs typeface="Times New Roman"/>
-                      </a:endParaRPr>
-                    </a:p>
-                  </a:txBody>
-                  <a:tcPr marL="68580" marR="68580" marT="0" marB="0"/>
-                </a:tc>
-                <a:tc>
-                  <a:txBody>
-                    <a:bodyPr/>
-                    <a:lstStyle/>
-                    <a:p>
-                      <a:pPr>
-                        <a:lnSpc>
-                          <a:spcPct val="115000"/>
-                        </a:lnSpc>
-                        <a:spcAft>
-                          <a:spcPts val="0"/>
-                        </a:spcAft>
-                      </a:pPr>
-                      <a:r>
-                        <a:rPr lang="en-US" sz="2400" dirty="0">
-                          <a:effectLst/>
-                          <a:latin typeface="+mn-lt"/>
-                          <a:ea typeface="Calibri"/>
-                          <a:cs typeface="Times New Roman"/>
-                        </a:rPr>
-                        <a:t>This file is hidden by default. It contains the list of packages managed by the Bower package manager.</a:t>
-                      </a:r>
-                      <a:endParaRPr lang="ro-RO" sz="2400" dirty="0">
-                        <a:effectLst/>
-                        <a:latin typeface="Calibri"/>
-                        <a:ea typeface="Calibri"/>
-                        <a:cs typeface="Times New Roman"/>
-                      </a:endParaRPr>
-                    </a:p>
-                  </a:txBody>
-                  <a:tcPr marL="68580" marR="68580" marT="0" marB="0"/>
-                </a:tc>
-                <a:extLst>
-                  <a:ext uri="{0D108BD9-81ED-4DB2-BD59-A6C34878D82A}">
-                    <a16:rowId xmlns:a16="http://schemas.microsoft.com/office/drawing/2014/main" val="3224437343"/>
-                  </a:ext>
-                </a:extLst>
-              </a:tr>
-              <a:tr h="202535">
-                <a:tc>
-                  <a:txBody>
-                    <a:bodyPr/>
-                    <a:lstStyle/>
-                    <a:p>
-                      <a:pPr>
-                        <a:lnSpc>
-                          <a:spcPct val="115000"/>
-                        </a:lnSpc>
-                        <a:spcAft>
-                          <a:spcPts val="0"/>
-                        </a:spcAft>
-                      </a:pPr>
-                      <a:r>
-                        <a:rPr lang="ro-RO" sz="2400" dirty="0">
-                          <a:effectLst/>
-                          <a:latin typeface="+mn-lt"/>
-                          <a:ea typeface="Calibri"/>
-                          <a:cs typeface="Times New Roman"/>
-                        </a:rPr>
-                        <a:t>/</a:t>
-                      </a:r>
-                      <a:r>
-                        <a:rPr lang="ro-RO" sz="2400" dirty="0" err="1">
-                          <a:effectLst/>
-                          <a:latin typeface="+mn-lt"/>
-                          <a:ea typeface="Calibri"/>
-                          <a:cs typeface="Times New Roman"/>
-                        </a:rPr>
-                        <a:t>project.json</a:t>
-                      </a:r>
-                      <a:endParaRPr lang="ro-RO" sz="2400" dirty="0">
-                        <a:effectLst/>
-                        <a:latin typeface="Calibri"/>
-                        <a:ea typeface="Calibri"/>
-                        <a:cs typeface="Times New Roman"/>
-                      </a:endParaRPr>
-                    </a:p>
-                  </a:txBody>
-                  <a:tcPr marL="68580" marR="68580" marT="0" marB="0"/>
-                </a:tc>
-                <a:tc>
-                  <a:txBody>
-                    <a:bodyPr/>
-                    <a:lstStyle/>
-                    <a:p>
-                      <a:pPr>
-                        <a:lnSpc>
-                          <a:spcPct val="115000"/>
-                        </a:lnSpc>
-                        <a:spcAft>
-                          <a:spcPts val="0"/>
-                        </a:spcAft>
-                      </a:pPr>
-                      <a:r>
-                        <a:rPr lang="en-US" sz="2400" dirty="0">
-                          <a:effectLst/>
-                          <a:latin typeface="+mn-lt"/>
-                          <a:ea typeface="Calibri"/>
-                          <a:cs typeface="Times New Roman"/>
-                        </a:rPr>
-                        <a:t>This file specifies some basic configuration options for the project, including the NuGet packages it uses.</a:t>
-                      </a:r>
-                      <a:endParaRPr lang="ro-RO" sz="2400" dirty="0">
-                        <a:effectLst/>
-                        <a:latin typeface="Calibri"/>
-                        <a:ea typeface="Calibri"/>
-                        <a:cs typeface="Times New Roman"/>
-                      </a:endParaRPr>
-                    </a:p>
-                  </a:txBody>
-                  <a:tcPr marL="68580" marR="68580" marT="0" marB="0"/>
-                </a:tc>
-                <a:extLst>
-                  <a:ext uri="{0D108BD9-81ED-4DB2-BD59-A6C34878D82A}">
-                    <a16:rowId xmlns:a16="http://schemas.microsoft.com/office/drawing/2014/main" val="3001444412"/>
-                  </a:ext>
-                </a:extLst>
-              </a:tr>
-              <a:tr h="202535">
-                <a:tc>
-                  <a:txBody>
-                    <a:bodyPr/>
-                    <a:lstStyle/>
-                    <a:p>
-                      <a:pPr>
-                        <a:lnSpc>
-                          <a:spcPct val="115000"/>
-                        </a:lnSpc>
-                        <a:spcAft>
-                          <a:spcPts val="0"/>
-                        </a:spcAft>
-                      </a:pPr>
-                      <a:r>
-                        <a:rPr lang="ro-RO" sz="2400" dirty="0">
-                          <a:effectLst/>
-                          <a:latin typeface="+mn-lt"/>
-                          <a:ea typeface="Calibri"/>
-                          <a:cs typeface="Times New Roman"/>
-                        </a:rPr>
-                        <a:t>/</a:t>
-                      </a:r>
-                      <a:r>
-                        <a:rPr lang="ro-RO" sz="2400" dirty="0" err="1">
-                          <a:effectLst/>
-                          <a:latin typeface="+mn-lt"/>
-                          <a:ea typeface="Calibri"/>
-                          <a:cs typeface="Times New Roman"/>
-                        </a:rPr>
                         <a:t>Program.cs</a:t>
                       </a:r>
                       <a:endParaRPr lang="ro-RO" sz="2400" dirty="0">
@@ -21787,7 +21587,7 @@
           <p:nvPr>
             <p:extLst>
               <p:ext uri="{D42A27DB-BD31-4B8C-83A1-F6EECF244321}">
-                <p14:modId xmlns:p14="http://schemas.microsoft.com/office/powerpoint/2010/main" val="277870776"/>
+                <p14:modId xmlns:p14="http://schemas.microsoft.com/office/powerpoint/2010/main" val="1182308336"/>
               </p:ext>
             </p:extLst>
           </p:nvPr>
@@ -22030,7 +21830,25 @@
                           <a:ea typeface="Calibri"/>
                           <a:cs typeface="Times New Roman"/>
                         </a:rPr>
-                        <a:t>This is where you put static content such as CSS files and images. It is also where the Bower package manager installs JavaScript and CSS packages</a:t>
+                        <a:t>This is where you put static content such as CSS files and images. It is also where </a:t>
+                      </a:r>
+                      <a:r>
+                        <a:rPr lang="en-US" sz="2400">
+                          <a:effectLst/>
+                          <a:latin typeface="+mn-lt"/>
+                          <a:ea typeface="Calibri"/>
+                          <a:cs typeface="Times New Roman"/>
+                        </a:rPr>
+                        <a:t>the package </a:t>
+                      </a:r>
+                      <a:r>
+                        <a:rPr lang="en-US" sz="2400" dirty="0">
+                          <a:effectLst/>
+                          <a:latin typeface="+mn-lt"/>
+                          <a:ea typeface="Calibri"/>
+                          <a:cs typeface="Times New Roman"/>
+                        </a:rPr>
+                        <a:t>manager installs JavaScript and CSS packages</a:t>
                       </a:r>
                       <a:endParaRPr lang="ro-RO" sz="2400" dirty="0">
                         <a:effectLst/>
@@ -23767,7 +23585,7 @@
               <a:rPr lang="en-US" u="sng" dirty="0">
                 <a:hlinkClick r:id="rId3"/>
               </a:rPr>
-              <a:t>https://docs.microsoft.com/en-us/dotnet/api/?view=aspnetcore-2.2</a:t>
+              <a:t>https://docs.microsoft.com/en-us/dotnet/api/?view=aspnetcore-3.1</a:t>
             </a:r>
             <a:endParaRPr lang="en-US" u="sng" dirty="0"/>
           </a:p>

</xml_diff>